<commit_message>
ppt com modelagens do banco
</commit_message>
<xml_diff>
--- a/documentacao/apresentação/MIT- 3ª sprint.pptx
+++ b/documentacao/apresentação/MIT- 3ª sprint.pptx
@@ -10309,13 +10309,7 @@
               <a:rPr lang="pt-BR" sz="4400" dirty="0">
                 <a:latin typeface="+mj-lt"/>
               </a:rPr>
-              <a:t> Principais </a:t>
-            </a:r>
-            <a:r>
-              <a:rPr lang="pt-BR" sz="4400" dirty="0">
-                <a:latin typeface="+mj-lt"/>
-              </a:rPr>
-              <a:t>requisitos - </a:t>
+              <a:t> Principais requisitos - </a:t>
             </a:r>
             <a:r>
               <a:rPr lang="pt-BR" sz="4400" dirty="0" err="1">
@@ -10894,7 +10888,6 @@
               <a:rPr lang="pt-BR" altLang="pt-BR" sz="2800" dirty="0"/>
               <a:t>Manual de instalação</a:t>
             </a:r>
-            <a:endParaRPr lang="pt-BR" altLang="pt-BR" sz="2800" dirty="0"/>
           </a:p>
           <a:p>
             <a:pPr marL="457200" lvl="1" indent="0">
@@ -13142,6 +13135,88 @@
           </a:p>
         </p:txBody>
       </p:sp>
+      <p:pic>
+        <p:nvPicPr>
+          <p:cNvPr id="2" name="Imagem 1"/>
+          <p:cNvPicPr>
+            <a:picLocks noChangeAspect="1"/>
+          </p:cNvPicPr>
+          <p:nvPr/>
+        </p:nvPicPr>
+        <p:blipFill>
+          <a:blip r:embed="rId2">
+            <a:extLst>
+              <a:ext uri="{BEBA8EAE-BF5A-486C-A8C5-ECC9F3942E4B}">
+                <a14:imgProps xmlns:a14="http://schemas.microsoft.com/office/drawing/2010/main">
+                  <a14:imgLayer r:embed="rId3">
+                    <a14:imgEffect>
+                      <a14:backgroundRemoval t="2655" b="98820" l="0" r="98430">
+                        <a14:foregroundMark x1="10266" y1="11504" x2="10266" y2="11209"/>
+                        <a14:foregroundMark x1="12923" y1="49263" x2="6401" y2="36283"/>
+                        <a14:foregroundMark x1="2415" y1="24484" x2="15459" y2="24779"/>
+                        <a14:foregroundMark x1="15459" y1="25074" x2="22585" y2="63717"/>
+                        <a14:foregroundMark x1="22585" y1="64012" x2="9420" y2="84071"/>
+                        <a14:foregroundMark x1="9300" y1="84366" x2="2053" y2="79941"/>
+                        <a14:foregroundMark x1="2053" y1="79941" x2="2174" y2="24779"/>
+                        <a14:foregroundMark x1="16787" y1="31268" x2="32729" y2="27434"/>
+                        <a14:foregroundMark x1="32729" y1="27434" x2="33092" y2="1180"/>
+                        <a14:foregroundMark x1="33092" y1="1180" x2="53502" y2="7670"/>
+                        <a14:foregroundMark x1="53502" y1="7670" x2="58454" y2="25074"/>
+                        <a14:foregroundMark x1="58454" y1="25664" x2="60507" y2="31858"/>
+                        <a14:foregroundMark x1="60749" y1="31858" x2="64614" y2="30383"/>
+                        <a14:foregroundMark x1="64614" y1="30383" x2="75845" y2="28024"/>
+                        <a14:foregroundMark x1="75845" y1="28024" x2="97947" y2="30973"/>
+                        <a14:foregroundMark x1="97947" y1="30973" x2="98551" y2="37168"/>
+                        <a14:foregroundMark x1="98551" y1="37168" x2="93116" y2="48378"/>
+                        <a14:foregroundMark x1="93116" y1="48378" x2="80314" y2="49558"/>
+                        <a14:foregroundMark x1="80314" y1="49558" x2="64130" y2="49853"/>
+                        <a14:foregroundMark x1="64010" y1="49853" x2="46739" y2="49263"/>
+                        <a14:foregroundMark x1="45169" y1="52212" x2="46256" y2="48968"/>
+                        <a14:foregroundMark x1="51087" y1="66962" x2="54710" y2="77286"/>
+                        <a14:foregroundMark x1="54710" y1="76991" x2="63043" y2="77581"/>
+                        <a14:foregroundMark x1="63043" y1="77581" x2="58454" y2="92035"/>
+                        <a14:foregroundMark x1="58454" y1="92035" x2="45048" y2="97050"/>
+                        <a14:foregroundMark x1="45048" y1="96460" x2="31643" y2="96460"/>
+                        <a14:foregroundMark x1="31643" y1="96460" x2="30676" y2="61652"/>
+                        <a14:foregroundMark x1="30797" y1="61652" x2="31401" y2="44838"/>
+                        <a14:foregroundMark x1="31401" y1="44838" x2="20290" y2="52212"/>
+                        <a14:foregroundMark x1="1570" y1="41003" x2="1932" y2="28319"/>
+                        <a14:backgroundMark x1="51087" y1="64012" x2="91787" y2="64897"/>
+                        <a14:backgroundMark x1="13768" y1="10914" x2="13768" y2="10914"/>
+                        <a14:backgroundMark x1="21498" y1="17699" x2="21498" y2="17699"/>
+                        <a14:backgroundMark x1="26812" y1="23599" x2="28502" y2="0"/>
+                        <a14:backgroundMark x1="26691" y1="5015" x2="845" y2="590"/>
+                        <a14:backgroundMark x1="65700" y1="15634" x2="56039" y2="1475"/>
+                        <a14:backgroundMark x1="65217" y1="15634" x2="98913" y2="25959"/>
+                        <a14:backgroundMark x1="51932" y1="54572" x2="99879" y2="51622"/>
+                        <a14:backgroundMark x1="30797" y1="96460" x2="23671" y2="64307"/>
+                        <a14:backgroundMark x1="23671" y1="65782" x2="4469" y2="91740"/>
+                        <a14:backgroundMark x1="7488" y1="85251" x2="0" y2="78171"/>
+                        <a14:backgroundMark x1="1329" y1="78466" x2="1329" y2="23304"/>
+                      </a14:backgroundRemoval>
+                    </a14:imgEffect>
+                  </a14:imgLayer>
+                </a14:imgProps>
+              </a:ext>
+              <a:ext uri="{28A0092B-C50C-407E-A947-70E740481C1C}">
+                <a14:useLocalDpi xmlns:a14="http://schemas.microsoft.com/office/drawing/2010/main" val="0"/>
+              </a:ext>
+            </a:extLst>
+          </a:blip>
+          <a:stretch>
+            <a:fillRect/>
+          </a:stretch>
+        </p:blipFill>
+        <p:spPr>
+          <a:xfrm>
+            <a:off x="245355" y="1891861"/>
+            <a:ext cx="9696025" cy="3969749"/>
+          </a:xfrm>
+          <a:prstGeom prst="rect">
+            <a:avLst/>
+          </a:prstGeom>
+        </p:spPr>
+      </p:pic>
     </p:spTree>
     <p:extLst>
       <p:ext uri="{BB962C8B-B14F-4D97-AF65-F5344CB8AC3E}">
@@ -13379,7 +13454,7 @@
         </p:nvSpPr>
         <p:spPr>
           <a:xfrm>
-            <a:off x="0" y="767016"/>
+            <a:off x="0" y="420175"/>
             <a:ext cx="9192126" cy="1154243"/>
           </a:xfrm>
           <a:prstGeom prst="homePlate">
@@ -13416,19 +13491,7 @@
               <a:rPr lang="pt-BR" sz="4400" dirty="0" smtClean="0">
                 <a:latin typeface="+mj-lt"/>
               </a:rPr>
-              <a:t>Modelagem </a:t>
-            </a:r>
-            <a:r>
-              <a:rPr lang="pt-BR" sz="4400" dirty="0" smtClean="0">
-                <a:latin typeface="+mj-lt"/>
-              </a:rPr>
-              <a:t>logica</a:t>
-            </a:r>
-            <a:r>
-              <a:rPr lang="pt-BR" sz="4400" dirty="0" smtClean="0">
-                <a:latin typeface="+mj-lt"/>
-              </a:rPr>
-              <a:t> de </a:t>
+              <a:t>Modelagem logica de </a:t>
             </a:r>
             <a:r>
               <a:rPr lang="pt-BR" sz="4400" dirty="0">
@@ -13439,6 +13502,70 @@
           </a:p>
         </p:txBody>
       </p:sp>
+      <p:pic>
+        <p:nvPicPr>
+          <p:cNvPr id="3" name="Imagem 2"/>
+          <p:cNvPicPr>
+            <a:picLocks noChangeAspect="1"/>
+          </p:cNvPicPr>
+          <p:nvPr/>
+        </p:nvPicPr>
+        <p:blipFill>
+          <a:blip r:embed="rId2">
+            <a:extLst>
+              <a:ext uri="{BEBA8EAE-BF5A-486C-A8C5-ECC9F3942E4B}">
+                <a14:imgProps xmlns:a14="http://schemas.microsoft.com/office/drawing/2010/main">
+                  <a14:imgLayer r:embed="rId3">
+                    <a14:imgEffect>
+                      <a14:backgroundRemoval t="0" b="100000" l="1397" r="100000">
+                        <a14:foregroundMark x1="6285" y1="15078" x2="18994" y2="16408"/>
+                        <a14:foregroundMark x1="58101" y1="43237" x2="56844" y2="9978"/>
+                        <a14:foregroundMark x1="56844" y1="9978" x2="38687" y2="10200"/>
+                        <a14:foregroundMark x1="38687" y1="10200" x2="38408" y2="47007"/>
+                        <a14:foregroundMark x1="38408" y1="47007" x2="57682" y2="47672"/>
+                        <a14:foregroundMark x1="77514" y1="18404" x2="78212" y2="41685"/>
+                        <a14:foregroundMark x1="78212" y1="41685" x2="80726" y2="41242"/>
+                        <a14:foregroundMark x1="40223" y1="67849" x2="52933" y2="66297"/>
+                        <a14:foregroundMark x1="47626" y1="62084" x2="47626" y2="62084"/>
+                        <a14:foregroundMark x1="47486" y1="59645" x2="47486" y2="59645"/>
+                        <a14:foregroundMark x1="47346" y1="58093" x2="47346" y2="58093"/>
+                        <a14:foregroundMark x1="47346" y1="55211" x2="47346" y2="55211"/>
+                        <a14:foregroundMark x1="47346" y1="54989" x2="47346" y2="54989"/>
+                        <a14:foregroundMark x1="47346" y1="54102" x2="47346" y2="54102"/>
+                        <a14:foregroundMark x1="22905" y1="30599" x2="22905" y2="30599"/>
+                        <a14:foregroundMark x1="23184" y1="29933" x2="23184" y2="29933"/>
+                        <a14:foregroundMark x1="23883" y1="29712" x2="24022" y2="29712"/>
+                        <a14:foregroundMark x1="24302" y1="29712" x2="24302" y2="29712"/>
+                        <a14:foregroundMark x1="24721" y1="29712" x2="25000" y2="29712"/>
+                        <a14:foregroundMark x1="25559" y1="29712" x2="25978" y2="29712"/>
+                        <a14:foregroundMark x1="26257" y1="29712" x2="34916" y2="30155"/>
+                        <a14:foregroundMark x1="59497" y1="30155" x2="75140" y2="29933"/>
+                        <a14:foregroundMark x1="47346" y1="64745" x2="47207" y2="50776"/>
+                        <a14:backgroundMark x1="6145" y1="5100" x2="20670" y2="7539"/>
+                      </a14:backgroundRemoval>
+                    </a14:imgEffect>
+                  </a14:imgLayer>
+                </a14:imgProps>
+              </a:ext>
+              <a:ext uri="{28A0092B-C50C-407E-A947-70E740481C1C}">
+                <a14:useLocalDpi xmlns:a14="http://schemas.microsoft.com/office/drawing/2010/main" val="0"/>
+              </a:ext>
+            </a:extLst>
+          </a:blip>
+          <a:stretch>
+            <a:fillRect/>
+          </a:stretch>
+        </p:blipFill>
+        <p:spPr>
+          <a:xfrm>
+            <a:off x="378372" y="1362084"/>
+            <a:ext cx="9050601" cy="5700868"/>
+          </a:xfrm>
+          <a:prstGeom prst="rect">
+            <a:avLst/>
+          </a:prstGeom>
+        </p:spPr>
+      </p:pic>
     </p:spTree>
     <p:extLst>
       <p:ext uri="{BB962C8B-B14F-4D97-AF65-F5344CB8AC3E}">
@@ -13527,13 +13654,7 @@
               <a:rPr lang="pt-BR" sz="4400" dirty="0" smtClean="0">
                 <a:latin typeface="+mj-lt"/>
               </a:rPr>
-              <a:t>Parâmetros utilizados</a:t>
-            </a:r>
-            <a:r>
-              <a:rPr lang="pt-BR" sz="4400" dirty="0" smtClean="0">
-                <a:latin typeface="+mj-lt"/>
-              </a:rPr>
-              <a:t> </a:t>
+              <a:t>Parâmetros utilizados </a:t>
             </a:r>
             <a:endParaRPr lang="pt-BR" sz="4400" dirty="0">
               <a:latin typeface="+mj-lt"/>
@@ -14072,13 +14193,7 @@
               <a:rPr lang="pt-BR" sz="4400" dirty="0" smtClean="0">
                 <a:latin typeface="+mj-lt"/>
               </a:rPr>
-              <a:t>Ferramenta de suporte</a:t>
-            </a:r>
-            <a:r>
-              <a:rPr lang="pt-BR" sz="4400" dirty="0" smtClean="0">
-                <a:latin typeface="+mj-lt"/>
-              </a:rPr>
-              <a:t> </a:t>
+              <a:t>Ferramenta de suporte </a:t>
             </a:r>
             <a:endParaRPr lang="pt-BR" sz="4400" dirty="0">
               <a:latin typeface="+mj-lt"/>
@@ -16764,9 +16879,6 @@
               </a:rPr>
               <a:t>Processo para tratar problemas</a:t>
             </a:r>
-            <a:endParaRPr lang="pt-BR" sz="4000" dirty="0" smtClean="0">
-              <a:latin typeface="+mj-lt"/>
-            </a:endParaRPr>
           </a:p>
         </p:txBody>
       </p:sp>
@@ -18489,13 +18601,7 @@
               <a:rPr lang="pt-BR" sz="4400" dirty="0" smtClean="0">
                 <a:latin typeface="+mj-lt"/>
               </a:rPr>
-              <a:t>Porque este </a:t>
-            </a:r>
-            <a:r>
-              <a:rPr lang="pt-BR" sz="4400" dirty="0" smtClean="0">
-                <a:latin typeface="+mj-lt"/>
-              </a:rPr>
-              <a:t>segmento?</a:t>
+              <a:t>Porque este segmento?</a:t>
             </a:r>
             <a:endParaRPr lang="pt-BR" sz="4400" dirty="0">
               <a:latin typeface="+mj-lt"/>
@@ -18548,13 +18654,7 @@
               <a:rPr lang="pt-BR" sz="2400" dirty="0" smtClean="0">
                 <a:latin typeface="+mj-lt"/>
               </a:rPr>
-              <a:t>mais de</a:t>
-            </a:r>
-            <a:r>
-              <a:rPr lang="pt-BR" sz="2400" dirty="0" smtClean="0">
-                <a:latin typeface="+mj-lt"/>
-              </a:rPr>
-              <a:t> </a:t>
+              <a:t>mais de </a:t>
             </a:r>
             <a:r>
               <a:rPr lang="pt-BR" sz="2400" dirty="0">
@@ -19476,13 +19576,7 @@
               <a:rPr lang="pt-BR" sz="4400" dirty="0" smtClean="0">
                 <a:latin typeface="+mj-lt"/>
               </a:rPr>
-              <a:t>Conhecendo a</a:t>
-            </a:r>
-            <a:r>
-              <a:rPr lang="pt-BR" sz="4400" dirty="0" smtClean="0">
-                <a:latin typeface="+mj-lt"/>
-              </a:rPr>
-              <a:t> </a:t>
+              <a:t>Conhecendo a </a:t>
             </a:r>
             <a:r>
               <a:rPr lang="pt-BR" sz="4400" dirty="0">

</xml_diff>